<commit_message>
Add Main Algo graph
</commit_message>
<xml_diff>
--- a/app_docs/OCT_new_version.pptx
+++ b/app_docs/OCT_new_version.pptx
@@ -11,6 +11,7 @@
     <p:sldId id="261" r:id="rId5"/>
     <p:sldId id="256" r:id="rId6"/>
     <p:sldId id="257" r:id="rId7"/>
+    <p:sldId id="263" r:id="rId8"/>
   </p:sldIdLst>
   <p:sldSz cx="12192000" cy="6858000"/>
   <p:notesSz cx="6858000" cy="9144000"/>
@@ -266,7 +267,7 @@
           <a:p>
             <a:fld id="{39739722-6190-4756-8A62-F80F2E446DBA}" type="datetimeFigureOut">
               <a:rPr lang="en-US" smtClean="0"/>
-              <a:t>5/19/2025</a:t>
+              <a:t>6/15/2025</a:t>
             </a:fld>
             <a:endParaRPr lang="en-US"/>
           </a:p>
@@ -466,7 +467,7 @@
           <a:p>
             <a:fld id="{39739722-6190-4756-8A62-F80F2E446DBA}" type="datetimeFigureOut">
               <a:rPr lang="en-US" smtClean="0"/>
-              <a:t>5/19/2025</a:t>
+              <a:t>6/15/2025</a:t>
             </a:fld>
             <a:endParaRPr lang="en-US"/>
           </a:p>
@@ -676,7 +677,7 @@
           <a:p>
             <a:fld id="{39739722-6190-4756-8A62-F80F2E446DBA}" type="datetimeFigureOut">
               <a:rPr lang="en-US" smtClean="0"/>
-              <a:t>5/19/2025</a:t>
+              <a:t>6/15/2025</a:t>
             </a:fld>
             <a:endParaRPr lang="en-US"/>
           </a:p>
@@ -876,7 +877,7 @@
           <a:p>
             <a:fld id="{39739722-6190-4756-8A62-F80F2E446DBA}" type="datetimeFigureOut">
               <a:rPr lang="en-US" smtClean="0"/>
-              <a:t>5/19/2025</a:t>
+              <a:t>6/15/2025</a:t>
             </a:fld>
             <a:endParaRPr lang="en-US"/>
           </a:p>
@@ -1152,7 +1153,7 @@
           <a:p>
             <a:fld id="{39739722-6190-4756-8A62-F80F2E446DBA}" type="datetimeFigureOut">
               <a:rPr lang="en-US" smtClean="0"/>
-              <a:t>5/19/2025</a:t>
+              <a:t>6/15/2025</a:t>
             </a:fld>
             <a:endParaRPr lang="en-US"/>
           </a:p>
@@ -1420,7 +1421,7 @@
           <a:p>
             <a:fld id="{39739722-6190-4756-8A62-F80F2E446DBA}" type="datetimeFigureOut">
               <a:rPr lang="en-US" smtClean="0"/>
-              <a:t>5/19/2025</a:t>
+              <a:t>6/15/2025</a:t>
             </a:fld>
             <a:endParaRPr lang="en-US"/>
           </a:p>
@@ -1835,7 +1836,7 @@
           <a:p>
             <a:fld id="{39739722-6190-4756-8A62-F80F2E446DBA}" type="datetimeFigureOut">
               <a:rPr lang="en-US" smtClean="0"/>
-              <a:t>5/19/2025</a:t>
+              <a:t>6/15/2025</a:t>
             </a:fld>
             <a:endParaRPr lang="en-US"/>
           </a:p>
@@ -1977,7 +1978,7 @@
           <a:p>
             <a:fld id="{39739722-6190-4756-8A62-F80F2E446DBA}" type="datetimeFigureOut">
               <a:rPr lang="en-US" smtClean="0"/>
-              <a:t>5/19/2025</a:t>
+              <a:t>6/15/2025</a:t>
             </a:fld>
             <a:endParaRPr lang="en-US"/>
           </a:p>
@@ -2090,7 +2091,7 @@
           <a:p>
             <a:fld id="{39739722-6190-4756-8A62-F80F2E446DBA}" type="datetimeFigureOut">
               <a:rPr lang="en-US" smtClean="0"/>
-              <a:t>5/19/2025</a:t>
+              <a:t>6/15/2025</a:t>
             </a:fld>
             <a:endParaRPr lang="en-US"/>
           </a:p>
@@ -2403,7 +2404,7 @@
           <a:p>
             <a:fld id="{39739722-6190-4756-8A62-F80F2E446DBA}" type="datetimeFigureOut">
               <a:rPr lang="en-US" smtClean="0"/>
-              <a:t>5/19/2025</a:t>
+              <a:t>6/15/2025</a:t>
             </a:fld>
             <a:endParaRPr lang="en-US"/>
           </a:p>
@@ -2692,7 +2693,7 @@
           <a:p>
             <a:fld id="{39739722-6190-4756-8A62-F80F2E446DBA}" type="datetimeFigureOut">
               <a:rPr lang="en-US" smtClean="0"/>
-              <a:t>5/19/2025</a:t>
+              <a:t>6/15/2025</a:t>
             </a:fld>
             <a:endParaRPr lang="en-US"/>
           </a:p>
@@ -2935,7 +2936,7 @@
           <a:p>
             <a:fld id="{39739722-6190-4756-8A62-F80F2E446DBA}" type="datetimeFigureOut">
               <a:rPr lang="en-US" smtClean="0"/>
-              <a:t>5/19/2025</a:t>
+              <a:t>6/15/2025</a:t>
             </a:fld>
             <a:endParaRPr lang="en-US"/>
           </a:p>
@@ -4661,13 +4662,8 @@
           <a:p>
             <a:r>
               <a:rPr lang="fr-FR" sz="1100" noProof="0" dirty="0"/>
-              <a:t>Stepper </a:t>
-            </a:r>
-            <a:r>
-              <a:rPr lang="fr-FR" sz="1100" noProof="0" dirty="0" err="1"/>
-              <a:t>Motor</a:t>
-            </a:r>
-            <a:endParaRPr lang="fr-FR" sz="1100" noProof="0" dirty="0"/>
+              <a:t>Stepper Motor</a:t>
+            </a:r>
           </a:p>
         </p:txBody>
       </p:sp>
@@ -4851,20 +4847,8 @@
           <a:lstStyle/>
           <a:p>
             <a:r>
-              <a:rPr lang="fr-FR" sz="1100" noProof="0" dirty="0" err="1"/>
-              <a:t>Piezo</a:t>
-            </a:r>
-            <a:r>
               <a:rPr lang="fr-FR" sz="1100" noProof="0" dirty="0"/>
-              <a:t> </a:t>
-            </a:r>
-            <a:r>
-              <a:rPr lang="fr-FR" sz="1100" noProof="0" dirty="0" err="1"/>
-              <a:t>Motor</a:t>
-            </a:r>
-            <a:r>
-              <a:rPr lang="fr-FR" sz="1100" noProof="0" dirty="0"/>
-              <a:t> – V0 =                     V </a:t>
+              <a:t>Piezo Motor – V0 =                     V </a:t>
             </a:r>
           </a:p>
         </p:txBody>
@@ -6755,15 +6739,7 @@
             </a:r>
             <a:r>
               <a:rPr lang="fr-FR" sz="1200" i="1" dirty="0"/>
-              <a:t> et </a:t>
-            </a:r>
-            <a:r>
-              <a:rPr lang="fr-FR" sz="1200" i="1" dirty="0" err="1"/>
-              <a:t>piezo</a:t>
-            </a:r>
-            <a:r>
-              <a:rPr lang="fr-FR" sz="1200" i="1" dirty="0"/>
-              <a:t>) - Déplacement</a:t>
+              <a:t> et piezo) - Déplacement</a:t>
             </a:r>
             <a:endParaRPr lang="fr-FR" sz="1200" dirty="0"/>
           </a:p>
@@ -7007,11 +6983,7 @@
           <a:p>
             <a:r>
               <a:rPr lang="fr-FR" sz="1200" i="1" dirty="0"/>
-              <a:t>Gestion du mode Live – test si caméra et </a:t>
-            </a:r>
-            <a:r>
-              <a:rPr lang="fr-FR" sz="1200" i="1" dirty="0" err="1"/>
-              <a:t>piezo</a:t>
+              <a:t>Gestion du mode Live – test si caméra et piezo</a:t>
             </a:r>
             <a:endParaRPr lang="fr-FR" sz="1200" dirty="0"/>
           </a:p>
@@ -12946,6 +12918,2247 @@
     <p:extLst>
       <p:ext uri="{BB962C8B-B14F-4D97-AF65-F5344CB8AC3E}">
         <p14:creationId xmlns:p14="http://schemas.microsoft.com/office/powerpoint/2010/main" val="3299165273"/>
+      </p:ext>
+    </p:extLst>
+  </p:cSld>
+  <p:clrMapOvr>
+    <a:masterClrMapping/>
+  </p:clrMapOvr>
+</p:sld>
+</file>
+
+<file path=ppt/slides/slide7.xml><?xml version="1.0" encoding="utf-8"?>
+<p:sld xmlns:a="http://schemas.openxmlformats.org/drawingml/2006/main" xmlns:r="http://schemas.openxmlformats.org/officeDocument/2006/relationships" xmlns:p="http://schemas.openxmlformats.org/presentationml/2006/main">
+  <p:cSld>
+    <p:spTree>
+      <p:nvGrpSpPr>
+        <p:cNvPr id="1" name="">
+          <a:extLst>
+            <a:ext uri="{FF2B5EF4-FFF2-40B4-BE49-F238E27FC236}">
+              <a16:creationId xmlns:a16="http://schemas.microsoft.com/office/drawing/2014/main" id="{BF2E0DBE-F026-9046-338A-C0985794E518}"/>
+            </a:ext>
+          </a:extLst>
+        </p:cNvPr>
+        <p:cNvGrpSpPr/>
+        <p:nvPr/>
+      </p:nvGrpSpPr>
+      <p:grpSpPr>
+        <a:xfrm>
+          <a:off x="0" y="0"/>
+          <a:ext cx="0" cy="0"/>
+          <a:chOff x="0" y="0"/>
+          <a:chExt cx="0" cy="0"/>
+        </a:xfrm>
+      </p:grpSpPr>
+      <p:pic>
+        <p:nvPicPr>
+          <p:cNvPr id="2" name="Image 1" descr="Une image contenant texte, Police, capture d’écran, logo&#10;&#10;Le contenu généré par l’IA peut être incorrect.">
+            <a:extLst>
+              <a:ext uri="{FF2B5EF4-FFF2-40B4-BE49-F238E27FC236}">
+                <a16:creationId xmlns:a16="http://schemas.microsoft.com/office/drawing/2014/main" id="{C72FAB7A-840C-97AA-F07F-E99E7C1571BF}"/>
+              </a:ext>
+            </a:extLst>
+          </p:cNvPr>
+          <p:cNvPicPr>
+            <a:picLocks noChangeAspect="1"/>
+          </p:cNvPicPr>
+          <p:nvPr/>
+        </p:nvPicPr>
+        <p:blipFill>
+          <a:blip r:embed="rId2">
+            <a:extLst>
+              <a:ext uri="{28A0092B-C50C-407E-A947-70E740481C1C}">
+                <a14:useLocalDpi xmlns:a14="http://schemas.microsoft.com/office/drawing/2010/main" val="0"/>
+              </a:ext>
+            </a:extLst>
+          </a:blip>
+          <a:stretch>
+            <a:fillRect/>
+          </a:stretch>
+        </p:blipFill>
+        <p:spPr>
+          <a:xfrm>
+            <a:off x="255938" y="114266"/>
+            <a:ext cx="1814160" cy="745236"/>
+          </a:xfrm>
+          <a:prstGeom prst="rect">
+            <a:avLst/>
+          </a:prstGeom>
+        </p:spPr>
+      </p:pic>
+      <p:sp>
+        <p:nvSpPr>
+          <p:cNvPr id="3" name="ZoneTexte 2">
+            <a:extLst>
+              <a:ext uri="{FF2B5EF4-FFF2-40B4-BE49-F238E27FC236}">
+                <a16:creationId xmlns:a16="http://schemas.microsoft.com/office/drawing/2014/main" id="{38A741A0-8B24-4099-D180-5064E4402860}"/>
+              </a:ext>
+            </a:extLst>
+          </p:cNvPr>
+          <p:cNvSpPr txBox="1"/>
+          <p:nvPr/>
+        </p:nvSpPr>
+        <p:spPr>
+          <a:xfrm>
+            <a:off x="125650" y="859502"/>
+            <a:ext cx="2074735" cy="307777"/>
+          </a:xfrm>
+          <a:prstGeom prst="rect">
+            <a:avLst/>
+          </a:prstGeom>
+          <a:noFill/>
+        </p:spPr>
+        <p:txBody>
+          <a:bodyPr wrap="none" rtlCol="0">
+            <a:spAutoFit/>
+          </a:bodyPr>
+          <a:lstStyle/>
+          <a:p>
+            <a:r>
+              <a:rPr lang="fr-FR" sz="1400" b="1" dirty="0"/>
+              <a:t>Nouvelle Interface OCT</a:t>
+            </a:r>
+          </a:p>
+        </p:txBody>
+      </p:sp>
+      <p:sp>
+        <p:nvSpPr>
+          <p:cNvPr id="24" name="ZoneTexte 23">
+            <a:extLst>
+              <a:ext uri="{FF2B5EF4-FFF2-40B4-BE49-F238E27FC236}">
+                <a16:creationId xmlns:a16="http://schemas.microsoft.com/office/drawing/2014/main" id="{1D69ADE8-A081-F5B3-0C2A-9711016B5209}"/>
+              </a:ext>
+            </a:extLst>
+          </p:cNvPr>
+          <p:cNvSpPr txBox="1"/>
+          <p:nvPr/>
+        </p:nvSpPr>
+        <p:spPr>
+          <a:xfrm>
+            <a:off x="257473" y="1167279"/>
+            <a:ext cx="1767215" cy="738664"/>
+          </a:xfrm>
+          <a:prstGeom prst="rect">
+            <a:avLst/>
+          </a:prstGeom>
+          <a:noFill/>
+        </p:spPr>
+        <p:txBody>
+          <a:bodyPr wrap="none" rtlCol="0">
+            <a:spAutoFit/>
+          </a:bodyPr>
+          <a:lstStyle/>
+          <a:p>
+            <a:r>
+              <a:rPr lang="fr-FR" sz="1200" i="1" dirty="0"/>
+              <a:t>PyQt6 et </a:t>
+            </a:r>
+            <a:r>
+              <a:rPr lang="fr-FR" sz="1200" i="1" dirty="0" err="1"/>
+              <a:t>PyLabLib</a:t>
+            </a:r>
+            <a:endParaRPr lang="fr-FR" sz="1200" i="1" dirty="0"/>
+          </a:p>
+          <a:p>
+            <a:endParaRPr lang="fr-FR" sz="1200" i="1" dirty="0"/>
+          </a:p>
+          <a:p>
+            <a:r>
+              <a:rPr lang="fr-FR" b="1" i="1" dirty="0"/>
+              <a:t>Main </a:t>
+            </a:r>
+            <a:r>
+              <a:rPr lang="fr-FR" b="1" i="1" dirty="0" err="1"/>
+              <a:t>Algorithm</a:t>
+            </a:r>
+            <a:endParaRPr lang="fr-FR" sz="1200" i="1" dirty="0"/>
+          </a:p>
+        </p:txBody>
+      </p:sp>
+      <p:cxnSp>
+        <p:nvCxnSpPr>
+          <p:cNvPr id="25" name="Connecteur droit 24">
+            <a:extLst>
+              <a:ext uri="{FF2B5EF4-FFF2-40B4-BE49-F238E27FC236}">
+                <a16:creationId xmlns:a16="http://schemas.microsoft.com/office/drawing/2014/main" id="{A2D4FF5C-9C76-767F-1C5A-CFA4BBF5A80E}"/>
+              </a:ext>
+            </a:extLst>
+          </p:cNvPr>
+          <p:cNvCxnSpPr>
+            <a:cxnSpLocks/>
+          </p:cNvCxnSpPr>
+          <p:nvPr/>
+        </p:nvCxnSpPr>
+        <p:spPr>
+          <a:xfrm>
+            <a:off x="2404872" y="364276"/>
+            <a:ext cx="0" cy="6191972"/>
+          </a:xfrm>
+          <a:prstGeom prst="line">
+            <a:avLst/>
+          </a:prstGeom>
+        </p:spPr>
+        <p:style>
+          <a:lnRef idx="2">
+            <a:schemeClr val="accent2"/>
+          </a:lnRef>
+          <a:fillRef idx="0">
+            <a:schemeClr val="accent2"/>
+          </a:fillRef>
+          <a:effectRef idx="1">
+            <a:schemeClr val="accent2"/>
+          </a:effectRef>
+          <a:fontRef idx="minor">
+            <a:schemeClr val="tx1"/>
+          </a:fontRef>
+        </p:style>
+      </p:cxnSp>
+      <p:sp>
+        <p:nvSpPr>
+          <p:cNvPr id="4" name="Rectangle : coins arrondis 3">
+            <a:extLst>
+              <a:ext uri="{FF2B5EF4-FFF2-40B4-BE49-F238E27FC236}">
+                <a16:creationId xmlns:a16="http://schemas.microsoft.com/office/drawing/2014/main" id="{B80786DD-17B3-135F-CEDE-81EC9D325DB1}"/>
+              </a:ext>
+            </a:extLst>
+          </p:cNvPr>
+          <p:cNvSpPr/>
+          <p:nvPr/>
+        </p:nvSpPr>
+        <p:spPr>
+          <a:xfrm>
+            <a:off x="2739646" y="859502"/>
+            <a:ext cx="2160773" cy="554950"/>
+          </a:xfrm>
+          <a:prstGeom prst="roundRect">
+            <a:avLst/>
+          </a:prstGeom>
+          <a:solidFill>
+            <a:schemeClr val="accent2">
+              <a:lumMod val="40000"/>
+              <a:lumOff val="60000"/>
+            </a:schemeClr>
+          </a:solidFill>
+        </p:spPr>
+        <p:style>
+          <a:lnRef idx="2">
+            <a:schemeClr val="accent1">
+              <a:shade val="15000"/>
+            </a:schemeClr>
+          </a:lnRef>
+          <a:fillRef idx="1">
+            <a:schemeClr val="accent1"/>
+          </a:fillRef>
+          <a:effectRef idx="0">
+            <a:schemeClr val="accent1"/>
+          </a:effectRef>
+          <a:fontRef idx="minor">
+            <a:schemeClr val="lt1"/>
+          </a:fontRef>
+        </p:style>
+        <p:txBody>
+          <a:bodyPr rtlCol="0" anchor="ctr"/>
+          <a:lstStyle/>
+          <a:p>
+            <a:pPr algn="ctr"/>
+            <a:r>
+              <a:rPr lang="en-US" sz="1600" dirty="0">
+                <a:solidFill>
+                  <a:schemeClr val="tx1"/>
+                </a:solidFill>
+              </a:rPr>
+              <a:t>Initialization</a:t>
+            </a:r>
+          </a:p>
+        </p:txBody>
+      </p:sp>
+      <p:sp>
+        <p:nvSpPr>
+          <p:cNvPr id="9" name="ZoneTexte 8">
+            <a:extLst>
+              <a:ext uri="{FF2B5EF4-FFF2-40B4-BE49-F238E27FC236}">
+                <a16:creationId xmlns:a16="http://schemas.microsoft.com/office/drawing/2014/main" id="{58DF6339-1715-C314-92E5-00DDA09C3A49}"/>
+              </a:ext>
+            </a:extLst>
+          </p:cNvPr>
+          <p:cNvSpPr txBox="1"/>
+          <p:nvPr/>
+        </p:nvSpPr>
+        <p:spPr>
+          <a:xfrm>
+            <a:off x="5229606" y="780074"/>
+            <a:ext cx="4399026" cy="276999"/>
+          </a:xfrm>
+          <a:prstGeom prst="rect">
+            <a:avLst/>
+          </a:prstGeom>
+          <a:noFill/>
+        </p:spPr>
+        <p:txBody>
+          <a:bodyPr wrap="square">
+            <a:spAutoFit/>
+          </a:bodyPr>
+          <a:lstStyle/>
+          <a:p>
+            <a:r>
+              <a:rPr lang="fr-FR" sz="1200" b="1" dirty="0"/>
+              <a:t>Camera</a:t>
+            </a:r>
+            <a:r>
+              <a:rPr lang="fr-FR" sz="1200" i="1" dirty="0"/>
+              <a:t> : open video flux, initialize exposure time and framerate</a:t>
+            </a:r>
+            <a:endParaRPr lang="fr-FR" sz="1200" dirty="0"/>
+          </a:p>
+        </p:txBody>
+      </p:sp>
+      <p:sp>
+        <p:nvSpPr>
+          <p:cNvPr id="12" name="ZoneTexte 11">
+            <a:extLst>
+              <a:ext uri="{FF2B5EF4-FFF2-40B4-BE49-F238E27FC236}">
+                <a16:creationId xmlns:a16="http://schemas.microsoft.com/office/drawing/2014/main" id="{B563FE79-1F4A-5C45-0DB6-1E5768A9015A}"/>
+              </a:ext>
+            </a:extLst>
+          </p:cNvPr>
+          <p:cNvSpPr txBox="1"/>
+          <p:nvPr/>
+        </p:nvSpPr>
+        <p:spPr>
+          <a:xfrm>
+            <a:off x="5229606" y="988299"/>
+            <a:ext cx="4399026" cy="276999"/>
+          </a:xfrm>
+          <a:prstGeom prst="rect">
+            <a:avLst/>
+          </a:prstGeom>
+          <a:noFill/>
+        </p:spPr>
+        <p:txBody>
+          <a:bodyPr wrap="square">
+            <a:spAutoFit/>
+          </a:bodyPr>
+          <a:lstStyle/>
+          <a:p>
+            <a:r>
+              <a:rPr lang="fr-FR" sz="1200" b="1" dirty="0"/>
+              <a:t>Stepper motor</a:t>
+            </a:r>
+            <a:r>
+              <a:rPr lang="fr-FR" sz="1200" i="1" dirty="0"/>
+              <a:t> : homing phase, move to position </a:t>
+            </a:r>
+            <a:r>
+              <a:rPr lang="fr-FR" sz="1200" b="1" i="1" dirty="0"/>
+              <a:t>Z0</a:t>
+            </a:r>
+            <a:r>
+              <a:rPr lang="fr-FR" sz="1200" i="1" dirty="0"/>
+              <a:t> </a:t>
+            </a:r>
+            <a:endParaRPr lang="fr-FR" sz="1200" dirty="0"/>
+          </a:p>
+        </p:txBody>
+      </p:sp>
+      <p:sp>
+        <p:nvSpPr>
+          <p:cNvPr id="13" name="ZoneTexte 12">
+            <a:extLst>
+              <a:ext uri="{FF2B5EF4-FFF2-40B4-BE49-F238E27FC236}">
+                <a16:creationId xmlns:a16="http://schemas.microsoft.com/office/drawing/2014/main" id="{2F79DD23-1C4D-9656-7B17-9B7C71BF7297}"/>
+              </a:ext>
+            </a:extLst>
+          </p:cNvPr>
+          <p:cNvSpPr txBox="1"/>
+          <p:nvPr/>
+        </p:nvSpPr>
+        <p:spPr>
+          <a:xfrm>
+            <a:off x="5229606" y="1196524"/>
+            <a:ext cx="4399026" cy="276999"/>
+          </a:xfrm>
+          <a:prstGeom prst="rect">
+            <a:avLst/>
+          </a:prstGeom>
+          <a:noFill/>
+        </p:spPr>
+        <p:txBody>
+          <a:bodyPr wrap="square">
+            <a:spAutoFit/>
+          </a:bodyPr>
+          <a:lstStyle/>
+          <a:p>
+            <a:r>
+              <a:rPr lang="fr-FR" sz="1200" b="1" dirty="0"/>
+              <a:t>Piezo actuator </a:t>
+            </a:r>
+            <a:r>
+              <a:rPr lang="fr-FR" sz="1200" i="1" dirty="0"/>
+              <a:t>: homing phase, apply voltage  </a:t>
+            </a:r>
+            <a:r>
+              <a:rPr lang="fr-FR" sz="1200" b="1" i="1" dirty="0"/>
+              <a:t>V0</a:t>
+            </a:r>
+            <a:r>
+              <a:rPr lang="fr-FR" sz="1200" i="1" dirty="0"/>
+              <a:t> </a:t>
+            </a:r>
+            <a:endParaRPr lang="fr-FR" sz="1200" dirty="0"/>
+          </a:p>
+        </p:txBody>
+      </p:sp>
+      <p:sp>
+        <p:nvSpPr>
+          <p:cNvPr id="17" name="Rectangle : coins arrondis 16">
+            <a:extLst>
+              <a:ext uri="{FF2B5EF4-FFF2-40B4-BE49-F238E27FC236}">
+                <a16:creationId xmlns:a16="http://schemas.microsoft.com/office/drawing/2014/main" id="{A27B0A0C-E69A-C997-79C9-7B9C3F29042B}"/>
+              </a:ext>
+            </a:extLst>
+          </p:cNvPr>
+          <p:cNvSpPr/>
+          <p:nvPr/>
+        </p:nvSpPr>
+        <p:spPr>
+          <a:xfrm>
+            <a:off x="2739646" y="1895227"/>
+            <a:ext cx="2160773" cy="554950"/>
+          </a:xfrm>
+          <a:prstGeom prst="roundRect">
+            <a:avLst/>
+          </a:prstGeom>
+          <a:solidFill>
+            <a:schemeClr val="accent2">
+              <a:lumMod val="40000"/>
+              <a:lumOff val="60000"/>
+            </a:schemeClr>
+          </a:solidFill>
+        </p:spPr>
+        <p:style>
+          <a:lnRef idx="2">
+            <a:schemeClr val="accent1">
+              <a:shade val="15000"/>
+            </a:schemeClr>
+          </a:lnRef>
+          <a:fillRef idx="1">
+            <a:schemeClr val="accent1"/>
+          </a:fillRef>
+          <a:effectRef idx="0">
+            <a:schemeClr val="accent1"/>
+          </a:effectRef>
+          <a:fontRef idx="minor">
+            <a:schemeClr val="lt1"/>
+          </a:fontRef>
+        </p:style>
+        <p:txBody>
+          <a:bodyPr rtlCol="0" anchor="ctr"/>
+          <a:lstStyle/>
+          <a:p>
+            <a:pPr algn="ctr"/>
+            <a:r>
+              <a:rPr lang="en-US" sz="1600" dirty="0">
+                <a:solidFill>
+                  <a:schemeClr val="tx1"/>
+                </a:solidFill>
+              </a:rPr>
+              <a:t>Live Mode</a:t>
+            </a:r>
+          </a:p>
+        </p:txBody>
+      </p:sp>
+      <p:sp>
+        <p:nvSpPr>
+          <p:cNvPr id="18" name="Rectangle : coins arrondis 17">
+            <a:extLst>
+              <a:ext uri="{FF2B5EF4-FFF2-40B4-BE49-F238E27FC236}">
+                <a16:creationId xmlns:a16="http://schemas.microsoft.com/office/drawing/2014/main" id="{A7016915-A1FB-4D01-29D2-25D3A2AE76F2}"/>
+              </a:ext>
+            </a:extLst>
+          </p:cNvPr>
+          <p:cNvSpPr/>
+          <p:nvPr/>
+        </p:nvSpPr>
+        <p:spPr>
+          <a:xfrm>
+            <a:off x="7467859" y="1903072"/>
+            <a:ext cx="2160773" cy="554950"/>
+          </a:xfrm>
+          <a:prstGeom prst="roundRect">
+            <a:avLst/>
+          </a:prstGeom>
+          <a:solidFill>
+            <a:schemeClr val="accent2">
+              <a:lumMod val="40000"/>
+              <a:lumOff val="60000"/>
+            </a:schemeClr>
+          </a:solidFill>
+        </p:spPr>
+        <p:style>
+          <a:lnRef idx="2">
+            <a:schemeClr val="accent1">
+              <a:shade val="15000"/>
+            </a:schemeClr>
+          </a:lnRef>
+          <a:fillRef idx="1">
+            <a:schemeClr val="accent1"/>
+          </a:fillRef>
+          <a:effectRef idx="0">
+            <a:schemeClr val="accent1"/>
+          </a:effectRef>
+          <a:fontRef idx="minor">
+            <a:schemeClr val="lt1"/>
+          </a:fontRef>
+        </p:style>
+        <p:txBody>
+          <a:bodyPr rtlCol="0" anchor="ctr"/>
+          <a:lstStyle/>
+          <a:p>
+            <a:pPr algn="ctr"/>
+            <a:r>
+              <a:rPr lang="en-US" sz="1600" dirty="0">
+                <a:solidFill>
+                  <a:schemeClr val="tx1"/>
+                </a:solidFill>
+              </a:rPr>
+              <a:t>Acquisition Mode</a:t>
+            </a:r>
+          </a:p>
+        </p:txBody>
+      </p:sp>
+      <p:sp>
+        <p:nvSpPr>
+          <p:cNvPr id="19" name="Rectangle : coins arrondis 18">
+            <a:extLst>
+              <a:ext uri="{FF2B5EF4-FFF2-40B4-BE49-F238E27FC236}">
+                <a16:creationId xmlns:a16="http://schemas.microsoft.com/office/drawing/2014/main" id="{5C346425-564D-F3A4-1946-E121CF4E6717}"/>
+              </a:ext>
+            </a:extLst>
+          </p:cNvPr>
+          <p:cNvSpPr/>
+          <p:nvPr/>
+        </p:nvSpPr>
+        <p:spPr>
+          <a:xfrm>
+            <a:off x="3249844" y="6105307"/>
+            <a:ext cx="1168151" cy="261610"/>
+          </a:xfrm>
+          <a:prstGeom prst="roundRect">
+            <a:avLst/>
+          </a:prstGeom>
+          <a:solidFill>
+            <a:schemeClr val="accent2">
+              <a:lumMod val="40000"/>
+              <a:lumOff val="60000"/>
+            </a:schemeClr>
+          </a:solidFill>
+        </p:spPr>
+        <p:style>
+          <a:lnRef idx="2">
+            <a:schemeClr val="accent1">
+              <a:shade val="15000"/>
+            </a:schemeClr>
+          </a:lnRef>
+          <a:fillRef idx="1">
+            <a:schemeClr val="accent1"/>
+          </a:fillRef>
+          <a:effectRef idx="0">
+            <a:schemeClr val="accent1"/>
+          </a:effectRef>
+          <a:fontRef idx="minor">
+            <a:schemeClr val="lt1"/>
+          </a:fontRef>
+        </p:style>
+        <p:txBody>
+          <a:bodyPr rtlCol="0" anchor="ctr"/>
+          <a:lstStyle/>
+          <a:p>
+            <a:pPr algn="ctr"/>
+            <a:r>
+              <a:rPr lang="en-US" sz="1200" dirty="0">
+                <a:solidFill>
+                  <a:schemeClr val="tx1"/>
+                </a:solidFill>
+              </a:rPr>
+              <a:t>Quit</a:t>
+            </a:r>
+          </a:p>
+        </p:txBody>
+      </p:sp>
+      <p:sp>
+        <p:nvSpPr>
+          <p:cNvPr id="20" name="Rectangle : coins arrondis 19">
+            <a:extLst>
+              <a:ext uri="{FF2B5EF4-FFF2-40B4-BE49-F238E27FC236}">
+                <a16:creationId xmlns:a16="http://schemas.microsoft.com/office/drawing/2014/main" id="{CF74BDDB-B6CC-223D-078B-0676D1799E23}"/>
+              </a:ext>
+            </a:extLst>
+          </p:cNvPr>
+          <p:cNvSpPr/>
+          <p:nvPr/>
+        </p:nvSpPr>
+        <p:spPr>
+          <a:xfrm>
+            <a:off x="3249850" y="2738566"/>
+            <a:ext cx="2081097" cy="280003"/>
+          </a:xfrm>
+          <a:prstGeom prst="roundRect">
+            <a:avLst/>
+          </a:prstGeom>
+        </p:spPr>
+        <p:style>
+          <a:lnRef idx="2">
+            <a:schemeClr val="accent1">
+              <a:shade val="15000"/>
+            </a:schemeClr>
+          </a:lnRef>
+          <a:fillRef idx="1">
+            <a:schemeClr val="accent1"/>
+          </a:fillRef>
+          <a:effectRef idx="0">
+            <a:schemeClr val="accent1"/>
+          </a:effectRef>
+          <a:fontRef idx="minor">
+            <a:schemeClr val="lt1"/>
+          </a:fontRef>
+        </p:style>
+        <p:txBody>
+          <a:bodyPr rtlCol="0" anchor="ctr"/>
+          <a:lstStyle/>
+          <a:p>
+            <a:pPr algn="ctr"/>
+            <a:r>
+              <a:rPr lang="fr-FR" sz="1400" dirty="0"/>
+              <a:t>Get N images / Mean </a:t>
+            </a:r>
+          </a:p>
+        </p:txBody>
+      </p:sp>
+      <p:sp>
+        <p:nvSpPr>
+          <p:cNvPr id="21" name="Rectangle : coins arrondis 20">
+            <a:extLst>
+              <a:ext uri="{FF2B5EF4-FFF2-40B4-BE49-F238E27FC236}">
+                <a16:creationId xmlns:a16="http://schemas.microsoft.com/office/drawing/2014/main" id="{A0994983-FB9B-8F2F-2115-4CAD9DC60D7F}"/>
+              </a:ext>
+            </a:extLst>
+          </p:cNvPr>
+          <p:cNvSpPr/>
+          <p:nvPr/>
+        </p:nvSpPr>
+        <p:spPr>
+          <a:xfrm>
+            <a:off x="3249846" y="4150931"/>
+            <a:ext cx="2081094" cy="280003"/>
+          </a:xfrm>
+          <a:prstGeom prst="roundRect">
+            <a:avLst/>
+          </a:prstGeom>
+        </p:spPr>
+        <p:style>
+          <a:lnRef idx="2">
+            <a:schemeClr val="accent1">
+              <a:shade val="15000"/>
+            </a:schemeClr>
+          </a:lnRef>
+          <a:fillRef idx="1">
+            <a:schemeClr val="accent1"/>
+          </a:fillRef>
+          <a:effectRef idx="0">
+            <a:schemeClr val="accent1"/>
+          </a:effectRef>
+          <a:fontRef idx="minor">
+            <a:schemeClr val="lt1"/>
+          </a:fontRef>
+        </p:style>
+        <p:txBody>
+          <a:bodyPr rtlCol="0" anchor="ctr"/>
+          <a:lstStyle/>
+          <a:p>
+            <a:pPr algn="ctr"/>
+            <a:r>
+              <a:rPr lang="fr-FR" sz="1400" dirty="0"/>
+              <a:t>Display images</a:t>
+            </a:r>
+          </a:p>
+        </p:txBody>
+      </p:sp>
+      <p:sp>
+        <p:nvSpPr>
+          <p:cNvPr id="22" name="Rectangle : coins arrondis 21">
+            <a:extLst>
+              <a:ext uri="{FF2B5EF4-FFF2-40B4-BE49-F238E27FC236}">
+                <a16:creationId xmlns:a16="http://schemas.microsoft.com/office/drawing/2014/main" id="{BCB53187-F6C4-4F16-F4A2-47C4A6919D82}"/>
+              </a:ext>
+            </a:extLst>
+          </p:cNvPr>
+          <p:cNvSpPr/>
+          <p:nvPr/>
+        </p:nvSpPr>
+        <p:spPr>
+          <a:xfrm>
+            <a:off x="3249849" y="3097828"/>
+            <a:ext cx="2081101" cy="280003"/>
+          </a:xfrm>
+          <a:prstGeom prst="roundRect">
+            <a:avLst/>
+          </a:prstGeom>
+        </p:spPr>
+        <p:style>
+          <a:lnRef idx="2">
+            <a:schemeClr val="accent1">
+              <a:shade val="15000"/>
+            </a:schemeClr>
+          </a:lnRef>
+          <a:fillRef idx="1">
+            <a:schemeClr val="accent1"/>
+          </a:fillRef>
+          <a:effectRef idx="0">
+            <a:schemeClr val="accent1"/>
+          </a:effectRef>
+          <a:fontRef idx="minor">
+            <a:schemeClr val="lt1"/>
+          </a:fontRef>
+        </p:style>
+        <p:txBody>
+          <a:bodyPr rtlCol="0" anchor="ctr"/>
+          <a:lstStyle/>
+          <a:p>
+            <a:pPr algn="ctr"/>
+            <a:r>
+              <a:rPr lang="fr-FR" sz="1400" dirty="0"/>
+              <a:t>Move Piezo to V0 + </a:t>
+            </a:r>
+            <a:r>
+              <a:rPr lang="el-GR" sz="1400" dirty="0">
+                <a:latin typeface="Arial" panose="020B0604020202020204" pitchFamily="34" charset="0"/>
+                <a:cs typeface="Arial" panose="020B0604020202020204" pitchFamily="34" charset="0"/>
+              </a:rPr>
+              <a:t>Δ</a:t>
+            </a:r>
+            <a:r>
+              <a:rPr lang="fr-FR" sz="1400" dirty="0"/>
+              <a:t>V</a:t>
+            </a:r>
+          </a:p>
+        </p:txBody>
+      </p:sp>
+      <p:sp>
+        <p:nvSpPr>
+          <p:cNvPr id="27" name="Rectangle : coins arrondis 26">
+            <a:extLst>
+              <a:ext uri="{FF2B5EF4-FFF2-40B4-BE49-F238E27FC236}">
+                <a16:creationId xmlns:a16="http://schemas.microsoft.com/office/drawing/2014/main" id="{144C19C0-7D55-F898-184F-3082ABF250D0}"/>
+              </a:ext>
+            </a:extLst>
+          </p:cNvPr>
+          <p:cNvSpPr/>
+          <p:nvPr/>
+        </p:nvSpPr>
+        <p:spPr>
+          <a:xfrm>
+            <a:off x="5524890" y="2738566"/>
+            <a:ext cx="899746" cy="280003"/>
+          </a:xfrm>
+          <a:prstGeom prst="roundRect">
+            <a:avLst/>
+          </a:prstGeom>
+          <a:solidFill>
+            <a:schemeClr val="bg1">
+              <a:lumMod val="95000"/>
+            </a:schemeClr>
+          </a:solidFill>
+        </p:spPr>
+        <p:style>
+          <a:lnRef idx="2">
+            <a:schemeClr val="accent1">
+              <a:shade val="15000"/>
+            </a:schemeClr>
+          </a:lnRef>
+          <a:fillRef idx="1">
+            <a:schemeClr val="accent1"/>
+          </a:fillRef>
+          <a:effectRef idx="0">
+            <a:schemeClr val="accent1"/>
+          </a:effectRef>
+          <a:fontRef idx="minor">
+            <a:schemeClr val="lt1"/>
+          </a:fontRef>
+        </p:style>
+        <p:txBody>
+          <a:bodyPr rtlCol="0" anchor="ctr"/>
+          <a:lstStyle/>
+          <a:p>
+            <a:pPr algn="ctr"/>
+            <a:r>
+              <a:rPr lang="en-US" sz="1200" dirty="0">
+                <a:solidFill>
+                  <a:schemeClr val="tx1"/>
+                </a:solidFill>
+              </a:rPr>
+              <a:t>Im1</a:t>
+            </a:r>
+          </a:p>
+        </p:txBody>
+      </p:sp>
+      <p:sp>
+        <p:nvSpPr>
+          <p:cNvPr id="28" name="Rectangle : coins arrondis 27">
+            <a:extLst>
+              <a:ext uri="{FF2B5EF4-FFF2-40B4-BE49-F238E27FC236}">
+                <a16:creationId xmlns:a16="http://schemas.microsoft.com/office/drawing/2014/main" id="{D5F9405B-9F8D-2997-8B11-80080EDF898F}"/>
+              </a:ext>
+            </a:extLst>
+          </p:cNvPr>
+          <p:cNvSpPr/>
+          <p:nvPr/>
+        </p:nvSpPr>
+        <p:spPr>
+          <a:xfrm>
+            <a:off x="3249849" y="3450327"/>
+            <a:ext cx="2081095" cy="280003"/>
+          </a:xfrm>
+          <a:prstGeom prst="roundRect">
+            <a:avLst/>
+          </a:prstGeom>
+        </p:spPr>
+        <p:style>
+          <a:lnRef idx="2">
+            <a:schemeClr val="accent1">
+              <a:shade val="15000"/>
+            </a:schemeClr>
+          </a:lnRef>
+          <a:fillRef idx="1">
+            <a:schemeClr val="accent1"/>
+          </a:fillRef>
+          <a:effectRef idx="0">
+            <a:schemeClr val="accent1"/>
+          </a:effectRef>
+          <a:fontRef idx="minor">
+            <a:schemeClr val="lt1"/>
+          </a:fontRef>
+        </p:style>
+        <p:txBody>
+          <a:bodyPr rtlCol="0" anchor="ctr"/>
+          <a:lstStyle/>
+          <a:p>
+            <a:pPr algn="ctr"/>
+            <a:r>
+              <a:rPr lang="fr-FR" sz="1400" dirty="0"/>
+              <a:t>Get N images / Mean </a:t>
+            </a:r>
+          </a:p>
+        </p:txBody>
+      </p:sp>
+      <p:sp>
+        <p:nvSpPr>
+          <p:cNvPr id="29" name="Rectangle : coins arrondis 28">
+            <a:extLst>
+              <a:ext uri="{FF2B5EF4-FFF2-40B4-BE49-F238E27FC236}">
+                <a16:creationId xmlns:a16="http://schemas.microsoft.com/office/drawing/2014/main" id="{9DF2437E-2A10-82F4-18EB-E139EDFB8EF9}"/>
+              </a:ext>
+            </a:extLst>
+          </p:cNvPr>
+          <p:cNvSpPr/>
+          <p:nvPr/>
+        </p:nvSpPr>
+        <p:spPr>
+          <a:xfrm>
+            <a:off x="5524890" y="3450326"/>
+            <a:ext cx="899746" cy="280003"/>
+          </a:xfrm>
+          <a:prstGeom prst="roundRect">
+            <a:avLst/>
+          </a:prstGeom>
+          <a:solidFill>
+            <a:schemeClr val="bg1">
+              <a:lumMod val="95000"/>
+            </a:schemeClr>
+          </a:solidFill>
+        </p:spPr>
+        <p:style>
+          <a:lnRef idx="2">
+            <a:schemeClr val="accent1">
+              <a:shade val="15000"/>
+            </a:schemeClr>
+          </a:lnRef>
+          <a:fillRef idx="1">
+            <a:schemeClr val="accent1"/>
+          </a:fillRef>
+          <a:effectRef idx="0">
+            <a:schemeClr val="accent1"/>
+          </a:effectRef>
+          <a:fontRef idx="minor">
+            <a:schemeClr val="lt1"/>
+          </a:fontRef>
+        </p:style>
+        <p:txBody>
+          <a:bodyPr rtlCol="0" anchor="ctr"/>
+          <a:lstStyle/>
+          <a:p>
+            <a:pPr algn="ctr"/>
+            <a:r>
+              <a:rPr lang="en-US" sz="1200" dirty="0">
+                <a:solidFill>
+                  <a:schemeClr val="tx1"/>
+                </a:solidFill>
+              </a:rPr>
+              <a:t>Im2</a:t>
+            </a:r>
+          </a:p>
+        </p:txBody>
+      </p:sp>
+      <p:sp>
+        <p:nvSpPr>
+          <p:cNvPr id="30" name="Rectangle : coins arrondis 29">
+            <a:extLst>
+              <a:ext uri="{FF2B5EF4-FFF2-40B4-BE49-F238E27FC236}">
+                <a16:creationId xmlns:a16="http://schemas.microsoft.com/office/drawing/2014/main" id="{F588AE5D-BCED-173A-6445-3AF2F1AEDB0B}"/>
+              </a:ext>
+            </a:extLst>
+          </p:cNvPr>
+          <p:cNvSpPr/>
+          <p:nvPr/>
+        </p:nvSpPr>
+        <p:spPr>
+          <a:xfrm>
+            <a:off x="3249844" y="4492965"/>
+            <a:ext cx="2081089" cy="280003"/>
+          </a:xfrm>
+          <a:prstGeom prst="roundRect">
+            <a:avLst/>
+          </a:prstGeom>
+        </p:spPr>
+        <p:style>
+          <a:lnRef idx="2">
+            <a:schemeClr val="accent1">
+              <a:shade val="15000"/>
+            </a:schemeClr>
+          </a:lnRef>
+          <a:fillRef idx="1">
+            <a:schemeClr val="accent1"/>
+          </a:fillRef>
+          <a:effectRef idx="0">
+            <a:schemeClr val="accent1"/>
+          </a:effectRef>
+          <a:fontRef idx="minor">
+            <a:schemeClr val="lt1"/>
+          </a:fontRef>
+        </p:style>
+        <p:txBody>
+          <a:bodyPr rtlCol="0" anchor="ctr"/>
+          <a:lstStyle/>
+          <a:p>
+            <a:pPr algn="ctr"/>
+            <a:r>
+              <a:rPr lang="fr-FR" sz="1400" dirty="0"/>
+              <a:t>Move Piezo to V0</a:t>
+            </a:r>
+          </a:p>
+        </p:txBody>
+      </p:sp>
+      <p:sp>
+        <p:nvSpPr>
+          <p:cNvPr id="31" name="Rectangle : coins arrondis 30">
+            <a:extLst>
+              <a:ext uri="{FF2B5EF4-FFF2-40B4-BE49-F238E27FC236}">
+                <a16:creationId xmlns:a16="http://schemas.microsoft.com/office/drawing/2014/main" id="{7BC94560-E906-6798-5E5C-131F9F1000AD}"/>
+              </a:ext>
+            </a:extLst>
+          </p:cNvPr>
+          <p:cNvSpPr/>
+          <p:nvPr/>
+        </p:nvSpPr>
+        <p:spPr>
+          <a:xfrm>
+            <a:off x="3249845" y="3802826"/>
+            <a:ext cx="2081095" cy="280003"/>
+          </a:xfrm>
+          <a:prstGeom prst="roundRect">
+            <a:avLst/>
+          </a:prstGeom>
+        </p:spPr>
+        <p:style>
+          <a:lnRef idx="2">
+            <a:schemeClr val="accent1">
+              <a:shade val="15000"/>
+            </a:schemeClr>
+          </a:lnRef>
+          <a:fillRef idx="1">
+            <a:schemeClr val="accent1"/>
+          </a:fillRef>
+          <a:effectRef idx="0">
+            <a:schemeClr val="accent1"/>
+          </a:effectRef>
+          <a:fontRef idx="minor">
+            <a:schemeClr val="lt1"/>
+          </a:fontRef>
+        </p:style>
+        <p:txBody>
+          <a:bodyPr rtlCol="0" anchor="ctr"/>
+          <a:lstStyle/>
+          <a:p>
+            <a:pPr algn="ctr"/>
+            <a:r>
+              <a:rPr lang="fr-FR" sz="1400" dirty="0"/>
+              <a:t>Process OCT image</a:t>
+            </a:r>
+          </a:p>
+        </p:txBody>
+      </p:sp>
+      <p:sp>
+        <p:nvSpPr>
+          <p:cNvPr id="32" name="Rectangle : coins arrondis 31">
+            <a:extLst>
+              <a:ext uri="{FF2B5EF4-FFF2-40B4-BE49-F238E27FC236}">
+                <a16:creationId xmlns:a16="http://schemas.microsoft.com/office/drawing/2014/main" id="{9E998D15-0F5C-C2F2-99EE-7AA8ECE7AD2B}"/>
+              </a:ext>
+            </a:extLst>
+          </p:cNvPr>
+          <p:cNvSpPr/>
+          <p:nvPr/>
+        </p:nvSpPr>
+        <p:spPr>
+          <a:xfrm>
+            <a:off x="5524890" y="3802826"/>
+            <a:ext cx="899746" cy="280003"/>
+          </a:xfrm>
+          <a:prstGeom prst="roundRect">
+            <a:avLst/>
+          </a:prstGeom>
+          <a:solidFill>
+            <a:schemeClr val="bg1">
+              <a:lumMod val="95000"/>
+            </a:schemeClr>
+          </a:solidFill>
+        </p:spPr>
+        <p:style>
+          <a:lnRef idx="2">
+            <a:schemeClr val="accent1">
+              <a:shade val="15000"/>
+            </a:schemeClr>
+          </a:lnRef>
+          <a:fillRef idx="1">
+            <a:schemeClr val="accent1"/>
+          </a:fillRef>
+          <a:effectRef idx="0">
+            <a:schemeClr val="accent1"/>
+          </a:effectRef>
+          <a:fontRef idx="minor">
+            <a:schemeClr val="lt1"/>
+          </a:fontRef>
+        </p:style>
+        <p:txBody>
+          <a:bodyPr rtlCol="0" anchor="ctr"/>
+          <a:lstStyle/>
+          <a:p>
+            <a:pPr algn="ctr"/>
+            <a:r>
+              <a:rPr lang="en-US" sz="1200" dirty="0">
+                <a:solidFill>
+                  <a:schemeClr val="tx1"/>
+                </a:solidFill>
+              </a:rPr>
+              <a:t>OCT</a:t>
+            </a:r>
+          </a:p>
+        </p:txBody>
+      </p:sp>
+      <p:sp>
+        <p:nvSpPr>
+          <p:cNvPr id="33" name="Rectangle : coins arrondis 32">
+            <a:extLst>
+              <a:ext uri="{FF2B5EF4-FFF2-40B4-BE49-F238E27FC236}">
+                <a16:creationId xmlns:a16="http://schemas.microsoft.com/office/drawing/2014/main" id="{75D80038-C46D-69F9-BE23-7F4338E377C5}"/>
+              </a:ext>
+            </a:extLst>
+          </p:cNvPr>
+          <p:cNvSpPr/>
+          <p:nvPr/>
+        </p:nvSpPr>
+        <p:spPr>
+          <a:xfrm>
+            <a:off x="8029114" y="2936769"/>
+            <a:ext cx="2081097" cy="280003"/>
+          </a:xfrm>
+          <a:prstGeom prst="roundRect">
+            <a:avLst/>
+          </a:prstGeom>
+          <a:solidFill>
+            <a:schemeClr val="tx2"/>
+          </a:solidFill>
+          <a:ln>
+            <a:solidFill>
+              <a:schemeClr val="tx1"/>
+            </a:solidFill>
+          </a:ln>
+        </p:spPr>
+        <p:style>
+          <a:lnRef idx="2">
+            <a:schemeClr val="accent1">
+              <a:shade val="15000"/>
+            </a:schemeClr>
+          </a:lnRef>
+          <a:fillRef idx="1">
+            <a:schemeClr val="accent1"/>
+          </a:fillRef>
+          <a:effectRef idx="0">
+            <a:schemeClr val="accent1"/>
+          </a:effectRef>
+          <a:fontRef idx="minor">
+            <a:schemeClr val="lt1"/>
+          </a:fontRef>
+        </p:style>
+        <p:txBody>
+          <a:bodyPr rtlCol="0" anchor="ctr"/>
+          <a:lstStyle/>
+          <a:p>
+            <a:pPr algn="ctr"/>
+            <a:r>
+              <a:rPr lang="fr-FR" sz="1400" dirty="0"/>
+              <a:t>Live MODE</a:t>
+            </a:r>
+          </a:p>
+        </p:txBody>
+      </p:sp>
+      <p:sp>
+        <p:nvSpPr>
+          <p:cNvPr id="34" name="Rectangle : coins arrondis 33">
+            <a:extLst>
+              <a:ext uri="{FF2B5EF4-FFF2-40B4-BE49-F238E27FC236}">
+                <a16:creationId xmlns:a16="http://schemas.microsoft.com/office/drawing/2014/main" id="{70521777-3E26-002F-C7D6-4EB9FBCABFEF}"/>
+              </a:ext>
+            </a:extLst>
+          </p:cNvPr>
+          <p:cNvSpPr/>
+          <p:nvPr/>
+        </p:nvSpPr>
+        <p:spPr>
+          <a:xfrm>
+            <a:off x="10249290" y="2936768"/>
+            <a:ext cx="899746" cy="280003"/>
+          </a:xfrm>
+          <a:prstGeom prst="roundRect">
+            <a:avLst/>
+          </a:prstGeom>
+          <a:solidFill>
+            <a:schemeClr val="bg1">
+              <a:lumMod val="95000"/>
+            </a:schemeClr>
+          </a:solidFill>
+        </p:spPr>
+        <p:style>
+          <a:lnRef idx="2">
+            <a:schemeClr val="accent1">
+              <a:shade val="15000"/>
+            </a:schemeClr>
+          </a:lnRef>
+          <a:fillRef idx="1">
+            <a:schemeClr val="accent1"/>
+          </a:fillRef>
+          <a:effectRef idx="0">
+            <a:schemeClr val="accent1"/>
+          </a:effectRef>
+          <a:fontRef idx="minor">
+            <a:schemeClr val="lt1"/>
+          </a:fontRef>
+        </p:style>
+        <p:txBody>
+          <a:bodyPr rtlCol="0" anchor="ctr"/>
+          <a:lstStyle/>
+          <a:p>
+            <a:pPr algn="ctr"/>
+            <a:r>
+              <a:rPr lang="en-US" sz="1200" dirty="0">
+                <a:solidFill>
+                  <a:schemeClr val="tx1"/>
+                </a:solidFill>
+              </a:rPr>
+              <a:t>OCT</a:t>
+            </a:r>
+          </a:p>
+        </p:txBody>
+      </p:sp>
+      <p:sp>
+        <p:nvSpPr>
+          <p:cNvPr id="35" name="Rectangle : coins arrondis 34">
+            <a:extLst>
+              <a:ext uri="{FF2B5EF4-FFF2-40B4-BE49-F238E27FC236}">
+                <a16:creationId xmlns:a16="http://schemas.microsoft.com/office/drawing/2014/main" id="{DBFDF25A-437B-A8EB-E460-9443DFD838E7}"/>
+              </a:ext>
+            </a:extLst>
+          </p:cNvPr>
+          <p:cNvSpPr/>
+          <p:nvPr/>
+        </p:nvSpPr>
+        <p:spPr>
+          <a:xfrm>
+            <a:off x="8029114" y="3300116"/>
+            <a:ext cx="2081097" cy="280003"/>
+          </a:xfrm>
+          <a:prstGeom prst="roundRect">
+            <a:avLst/>
+          </a:prstGeom>
+        </p:spPr>
+        <p:style>
+          <a:lnRef idx="2">
+            <a:schemeClr val="accent1">
+              <a:shade val="15000"/>
+            </a:schemeClr>
+          </a:lnRef>
+          <a:fillRef idx="1">
+            <a:schemeClr val="accent1"/>
+          </a:fillRef>
+          <a:effectRef idx="0">
+            <a:schemeClr val="accent1"/>
+          </a:effectRef>
+          <a:fontRef idx="minor">
+            <a:schemeClr val="lt1"/>
+          </a:fontRef>
+        </p:style>
+        <p:txBody>
+          <a:bodyPr rtlCol="0" anchor="ctr"/>
+          <a:lstStyle/>
+          <a:p>
+            <a:pPr algn="ctr"/>
+            <a:r>
+              <a:rPr lang="fr-FR" sz="1400" dirty="0"/>
+              <a:t>Save OCT image in file</a:t>
+            </a:r>
+          </a:p>
+        </p:txBody>
+      </p:sp>
+      <p:sp>
+        <p:nvSpPr>
+          <p:cNvPr id="36" name="Rectangle : coins arrondis 35">
+            <a:extLst>
+              <a:ext uri="{FF2B5EF4-FFF2-40B4-BE49-F238E27FC236}">
+                <a16:creationId xmlns:a16="http://schemas.microsoft.com/office/drawing/2014/main" id="{189F3D91-C6A5-2396-FE34-44862A3B4AD0}"/>
+              </a:ext>
+            </a:extLst>
+          </p:cNvPr>
+          <p:cNvSpPr/>
+          <p:nvPr/>
+        </p:nvSpPr>
+        <p:spPr>
+          <a:xfrm>
+            <a:off x="8029114" y="3663463"/>
+            <a:ext cx="2081097" cy="280003"/>
+          </a:xfrm>
+          <a:prstGeom prst="roundRect">
+            <a:avLst/>
+          </a:prstGeom>
+        </p:spPr>
+        <p:style>
+          <a:lnRef idx="2">
+            <a:schemeClr val="accent1">
+              <a:shade val="15000"/>
+            </a:schemeClr>
+          </a:lnRef>
+          <a:fillRef idx="1">
+            <a:schemeClr val="accent1"/>
+          </a:fillRef>
+          <a:effectRef idx="0">
+            <a:schemeClr val="accent1"/>
+          </a:effectRef>
+          <a:fontRef idx="minor">
+            <a:schemeClr val="lt1"/>
+          </a:fontRef>
+        </p:style>
+        <p:txBody>
+          <a:bodyPr rtlCol="0" anchor="ctr"/>
+          <a:lstStyle/>
+          <a:p>
+            <a:pPr algn="ctr"/>
+            <a:r>
+              <a:rPr lang="fr-FR" sz="1200" dirty="0"/>
+              <a:t>Move Stepper of p distance</a:t>
+            </a:r>
+          </a:p>
+        </p:txBody>
+      </p:sp>
+      <p:sp>
+        <p:nvSpPr>
+          <p:cNvPr id="37" name="Rectangle : coins arrondis 36">
+            <a:extLst>
+              <a:ext uri="{FF2B5EF4-FFF2-40B4-BE49-F238E27FC236}">
+                <a16:creationId xmlns:a16="http://schemas.microsoft.com/office/drawing/2014/main" id="{B27CFA04-BB78-5A0B-F9E2-4FE9537C3B91}"/>
+              </a:ext>
+            </a:extLst>
+          </p:cNvPr>
+          <p:cNvSpPr/>
+          <p:nvPr/>
+        </p:nvSpPr>
+        <p:spPr>
+          <a:xfrm>
+            <a:off x="8029114" y="4456578"/>
+            <a:ext cx="2081097" cy="280003"/>
+          </a:xfrm>
+          <a:prstGeom prst="roundRect">
+            <a:avLst/>
+          </a:prstGeom>
+        </p:spPr>
+        <p:style>
+          <a:lnRef idx="2">
+            <a:schemeClr val="accent1">
+              <a:shade val="15000"/>
+            </a:schemeClr>
+          </a:lnRef>
+          <a:fillRef idx="1">
+            <a:schemeClr val="accent1"/>
+          </a:fillRef>
+          <a:effectRef idx="0">
+            <a:schemeClr val="accent1"/>
+          </a:effectRef>
+          <a:fontRef idx="minor">
+            <a:schemeClr val="lt1"/>
+          </a:fontRef>
+        </p:style>
+        <p:txBody>
+          <a:bodyPr rtlCol="0" anchor="ctr"/>
+          <a:lstStyle/>
+          <a:p>
+            <a:pPr algn="ctr"/>
+            <a:r>
+              <a:rPr lang="fr-FR" sz="1200" dirty="0"/>
+              <a:t>Move Stepper of p distance</a:t>
+            </a:r>
+          </a:p>
+        </p:txBody>
+      </p:sp>
+      <p:cxnSp>
+        <p:nvCxnSpPr>
+          <p:cNvPr id="39" name="Connecteur droit avec flèche 38">
+            <a:extLst>
+              <a:ext uri="{FF2B5EF4-FFF2-40B4-BE49-F238E27FC236}">
+                <a16:creationId xmlns:a16="http://schemas.microsoft.com/office/drawing/2014/main" id="{A0C2E564-10B2-3460-1948-39EBE0128CD9}"/>
+              </a:ext>
+            </a:extLst>
+          </p:cNvPr>
+          <p:cNvCxnSpPr/>
+          <p:nvPr/>
+        </p:nvCxnSpPr>
+        <p:spPr>
+          <a:xfrm>
+            <a:off x="5470026" y="2084832"/>
+            <a:ext cx="1442838" cy="0"/>
+          </a:xfrm>
+          <a:prstGeom prst="straightConnector1">
+            <a:avLst/>
+          </a:prstGeom>
+          <a:ln>
+            <a:prstDash val="sysDash"/>
+            <a:tailEnd type="triangle"/>
+          </a:ln>
+        </p:spPr>
+        <p:style>
+          <a:lnRef idx="2">
+            <a:schemeClr val="accent1"/>
+          </a:lnRef>
+          <a:fillRef idx="0">
+            <a:schemeClr val="accent1"/>
+          </a:fillRef>
+          <a:effectRef idx="1">
+            <a:schemeClr val="accent1"/>
+          </a:effectRef>
+          <a:fontRef idx="minor">
+            <a:schemeClr val="tx1"/>
+          </a:fontRef>
+        </p:style>
+      </p:cxnSp>
+      <p:sp>
+        <p:nvSpPr>
+          <p:cNvPr id="40" name="Rectangle : coins arrondis 39">
+            <a:extLst>
+              <a:ext uri="{FF2B5EF4-FFF2-40B4-BE49-F238E27FC236}">
+                <a16:creationId xmlns:a16="http://schemas.microsoft.com/office/drawing/2014/main" id="{E6D40847-7BD8-00E8-E285-71955115816A}"/>
+              </a:ext>
+            </a:extLst>
+          </p:cNvPr>
+          <p:cNvSpPr/>
+          <p:nvPr/>
+        </p:nvSpPr>
+        <p:spPr>
+          <a:xfrm>
+            <a:off x="5822344" y="1858934"/>
+            <a:ext cx="899746" cy="180550"/>
+          </a:xfrm>
+          <a:prstGeom prst="roundRect">
+            <a:avLst/>
+          </a:prstGeom>
+          <a:solidFill>
+            <a:schemeClr val="accent2"/>
+          </a:solidFill>
+        </p:spPr>
+        <p:style>
+          <a:lnRef idx="2">
+            <a:schemeClr val="accent1">
+              <a:shade val="15000"/>
+            </a:schemeClr>
+          </a:lnRef>
+          <a:fillRef idx="1">
+            <a:schemeClr val="accent1"/>
+          </a:fillRef>
+          <a:effectRef idx="0">
+            <a:schemeClr val="accent1"/>
+          </a:effectRef>
+          <a:fontRef idx="minor">
+            <a:schemeClr val="lt1"/>
+          </a:fontRef>
+        </p:style>
+        <p:txBody>
+          <a:bodyPr rtlCol="0" anchor="ctr"/>
+          <a:lstStyle/>
+          <a:p>
+            <a:pPr algn="ctr"/>
+            <a:r>
+              <a:rPr lang="en-US" sz="1200" dirty="0">
+                <a:solidFill>
+                  <a:schemeClr val="bg1"/>
+                </a:solidFill>
+              </a:rPr>
+              <a:t>Start</a:t>
+            </a:r>
+          </a:p>
+        </p:txBody>
+      </p:sp>
+      <p:sp>
+        <p:nvSpPr>
+          <p:cNvPr id="44" name="Rectangle : coins arrondis 43">
+            <a:extLst>
+              <a:ext uri="{FF2B5EF4-FFF2-40B4-BE49-F238E27FC236}">
+                <a16:creationId xmlns:a16="http://schemas.microsoft.com/office/drawing/2014/main" id="{AD0395E0-3119-F06E-866D-597C306B8B45}"/>
+              </a:ext>
+            </a:extLst>
+          </p:cNvPr>
+          <p:cNvSpPr/>
+          <p:nvPr/>
+        </p:nvSpPr>
+        <p:spPr>
+          <a:xfrm>
+            <a:off x="5741572" y="2323255"/>
+            <a:ext cx="899746" cy="180550"/>
+          </a:xfrm>
+          <a:prstGeom prst="roundRect">
+            <a:avLst/>
+          </a:prstGeom>
+          <a:solidFill>
+            <a:schemeClr val="accent2"/>
+          </a:solidFill>
+        </p:spPr>
+        <p:style>
+          <a:lnRef idx="2">
+            <a:schemeClr val="accent1">
+              <a:shade val="15000"/>
+            </a:schemeClr>
+          </a:lnRef>
+          <a:fillRef idx="1">
+            <a:schemeClr val="accent1"/>
+          </a:fillRef>
+          <a:effectRef idx="0">
+            <a:schemeClr val="accent1"/>
+          </a:effectRef>
+          <a:fontRef idx="minor">
+            <a:schemeClr val="lt1"/>
+          </a:fontRef>
+        </p:style>
+        <p:txBody>
+          <a:bodyPr rtlCol="0" anchor="ctr"/>
+          <a:lstStyle/>
+          <a:p>
+            <a:pPr algn="ctr"/>
+            <a:r>
+              <a:rPr lang="en-US" sz="1200" dirty="0">
+                <a:solidFill>
+                  <a:schemeClr val="bg1"/>
+                </a:solidFill>
+              </a:rPr>
+              <a:t>Stop</a:t>
+            </a:r>
+          </a:p>
+        </p:txBody>
+      </p:sp>
+      <p:cxnSp>
+        <p:nvCxnSpPr>
+          <p:cNvPr id="45" name="Connecteur droit avec flèche 44">
+            <a:extLst>
+              <a:ext uri="{FF2B5EF4-FFF2-40B4-BE49-F238E27FC236}">
+                <a16:creationId xmlns:a16="http://schemas.microsoft.com/office/drawing/2014/main" id="{0866807C-FABC-C3A1-9A6D-932A6AB9284A}"/>
+              </a:ext>
+            </a:extLst>
+          </p:cNvPr>
+          <p:cNvCxnSpPr>
+            <a:cxnSpLocks/>
+          </p:cNvCxnSpPr>
+          <p:nvPr/>
+        </p:nvCxnSpPr>
+        <p:spPr>
+          <a:xfrm flipH="1" flipV="1">
+            <a:off x="5470026" y="2264871"/>
+            <a:ext cx="1442838" cy="5362"/>
+          </a:xfrm>
+          <a:prstGeom prst="straightConnector1">
+            <a:avLst/>
+          </a:prstGeom>
+          <a:ln>
+            <a:prstDash val="sysDash"/>
+            <a:tailEnd type="triangle"/>
+          </a:ln>
+        </p:spPr>
+        <p:style>
+          <a:lnRef idx="2">
+            <a:schemeClr val="accent1"/>
+          </a:lnRef>
+          <a:fillRef idx="0">
+            <a:schemeClr val="accent1"/>
+          </a:fillRef>
+          <a:effectRef idx="1">
+            <a:schemeClr val="accent1"/>
+          </a:effectRef>
+          <a:fontRef idx="minor">
+            <a:schemeClr val="tx1"/>
+          </a:fontRef>
+        </p:style>
+      </p:cxnSp>
+      <p:sp>
+        <p:nvSpPr>
+          <p:cNvPr id="54" name="Rectangle : coins arrondis 53">
+            <a:extLst>
+              <a:ext uri="{FF2B5EF4-FFF2-40B4-BE49-F238E27FC236}">
+                <a16:creationId xmlns:a16="http://schemas.microsoft.com/office/drawing/2014/main" id="{13602D12-EF50-FAAD-7218-59D3A72CA708}"/>
+              </a:ext>
+            </a:extLst>
+          </p:cNvPr>
+          <p:cNvSpPr/>
+          <p:nvPr/>
+        </p:nvSpPr>
+        <p:spPr>
+          <a:xfrm>
+            <a:off x="8029113" y="4057715"/>
+            <a:ext cx="2081097" cy="280003"/>
+          </a:xfrm>
+          <a:prstGeom prst="roundRect">
+            <a:avLst/>
+          </a:prstGeom>
+          <a:solidFill>
+            <a:schemeClr val="accent2"/>
+          </a:solidFill>
+        </p:spPr>
+        <p:style>
+          <a:lnRef idx="2">
+            <a:schemeClr val="accent1">
+              <a:shade val="15000"/>
+            </a:schemeClr>
+          </a:lnRef>
+          <a:fillRef idx="1">
+            <a:schemeClr val="accent1"/>
+          </a:fillRef>
+          <a:effectRef idx="0">
+            <a:schemeClr val="accent1"/>
+          </a:effectRef>
+          <a:fontRef idx="minor">
+            <a:schemeClr val="lt1"/>
+          </a:fontRef>
+        </p:style>
+        <p:txBody>
+          <a:bodyPr rtlCol="0" anchor="ctr"/>
+          <a:lstStyle/>
+          <a:p>
+            <a:pPr algn="ctr"/>
+            <a:r>
+              <a:rPr lang="fr-FR" sz="1200" dirty="0"/>
+              <a:t>Number of steps ?</a:t>
+            </a:r>
+          </a:p>
+        </p:txBody>
+      </p:sp>
+      <p:cxnSp>
+        <p:nvCxnSpPr>
+          <p:cNvPr id="70" name="Connecteur : en angle 69">
+            <a:extLst>
+              <a:ext uri="{FF2B5EF4-FFF2-40B4-BE49-F238E27FC236}">
+                <a16:creationId xmlns:a16="http://schemas.microsoft.com/office/drawing/2014/main" id="{F2342D2A-59F9-81B2-E01A-447295099EAE}"/>
+              </a:ext>
+            </a:extLst>
+          </p:cNvPr>
+          <p:cNvCxnSpPr>
+            <a:stCxn id="37" idx="2"/>
+            <a:endCxn id="33" idx="0"/>
+          </p:cNvCxnSpPr>
+          <p:nvPr/>
+        </p:nvCxnSpPr>
+        <p:spPr>
+          <a:xfrm rot="5400000" flipH="1">
+            <a:off x="8169757" y="3836675"/>
+            <a:ext cx="1799812" cy="12700"/>
+          </a:xfrm>
+          <a:prstGeom prst="bentConnector5">
+            <a:avLst>
+              <a:gd name="adj1" fmla="val -12701"/>
+              <a:gd name="adj2" fmla="val -18446709"/>
+              <a:gd name="adj3" fmla="val 112701"/>
+            </a:avLst>
+          </a:prstGeom>
+          <a:ln>
+            <a:prstDash val="sysDash"/>
+            <a:tailEnd type="triangle"/>
+          </a:ln>
+        </p:spPr>
+        <p:style>
+          <a:lnRef idx="2">
+            <a:schemeClr val="accent1"/>
+          </a:lnRef>
+          <a:fillRef idx="0">
+            <a:schemeClr val="accent1"/>
+          </a:fillRef>
+          <a:effectRef idx="1">
+            <a:schemeClr val="accent1"/>
+          </a:effectRef>
+          <a:fontRef idx="minor">
+            <a:schemeClr val="tx1"/>
+          </a:fontRef>
+        </p:style>
+      </p:cxnSp>
+      <p:cxnSp>
+        <p:nvCxnSpPr>
+          <p:cNvPr id="72" name="Connecteur droit avec flèche 71">
+            <a:extLst>
+              <a:ext uri="{FF2B5EF4-FFF2-40B4-BE49-F238E27FC236}">
+                <a16:creationId xmlns:a16="http://schemas.microsoft.com/office/drawing/2014/main" id="{A93B6B49-E825-25A3-CD80-A657C7878294}"/>
+              </a:ext>
+            </a:extLst>
+          </p:cNvPr>
+          <p:cNvCxnSpPr>
+            <a:cxnSpLocks/>
+            <a:stCxn id="54" idx="1"/>
+          </p:cNvCxnSpPr>
+          <p:nvPr/>
+        </p:nvCxnSpPr>
+        <p:spPr>
+          <a:xfrm flipH="1" flipV="1">
+            <a:off x="7281056" y="4197716"/>
+            <a:ext cx="748057" cy="1"/>
+          </a:xfrm>
+          <a:prstGeom prst="straightConnector1">
+            <a:avLst/>
+          </a:prstGeom>
+          <a:ln>
+            <a:prstDash val="sysDash"/>
+            <a:tailEnd type="triangle"/>
+          </a:ln>
+        </p:spPr>
+        <p:style>
+          <a:lnRef idx="2">
+            <a:schemeClr val="accent1"/>
+          </a:lnRef>
+          <a:fillRef idx="0">
+            <a:schemeClr val="accent1"/>
+          </a:fillRef>
+          <a:effectRef idx="1">
+            <a:schemeClr val="accent1"/>
+          </a:effectRef>
+          <a:fontRef idx="minor">
+            <a:schemeClr val="tx1"/>
+          </a:fontRef>
+        </p:style>
+      </p:cxnSp>
+      <p:sp>
+        <p:nvSpPr>
+          <p:cNvPr id="76" name="ZoneTexte 75">
+            <a:extLst>
+              <a:ext uri="{FF2B5EF4-FFF2-40B4-BE49-F238E27FC236}">
+                <a16:creationId xmlns:a16="http://schemas.microsoft.com/office/drawing/2014/main" id="{3012D1B2-F361-4737-ED36-371A7750970E}"/>
+              </a:ext>
+            </a:extLst>
+          </p:cNvPr>
+          <p:cNvSpPr txBox="1"/>
+          <p:nvPr/>
+        </p:nvSpPr>
+        <p:spPr>
+          <a:xfrm>
+            <a:off x="7379899" y="3989491"/>
+            <a:ext cx="550370" cy="261610"/>
+          </a:xfrm>
+          <a:prstGeom prst="rect">
+            <a:avLst/>
+          </a:prstGeom>
+          <a:noFill/>
+        </p:spPr>
+        <p:txBody>
+          <a:bodyPr wrap="square">
+            <a:spAutoFit/>
+          </a:bodyPr>
+          <a:lstStyle/>
+          <a:p>
+            <a:r>
+              <a:rPr lang="fr-FR" sz="1100" i="1" dirty="0"/>
+              <a:t>Yes</a:t>
+            </a:r>
+            <a:endParaRPr lang="fr-FR" sz="1100" dirty="0"/>
+          </a:p>
+        </p:txBody>
+      </p:sp>
+      <p:cxnSp>
+        <p:nvCxnSpPr>
+          <p:cNvPr id="77" name="Connecteur droit avec flèche 76">
+            <a:extLst>
+              <a:ext uri="{FF2B5EF4-FFF2-40B4-BE49-F238E27FC236}">
+                <a16:creationId xmlns:a16="http://schemas.microsoft.com/office/drawing/2014/main" id="{89758017-2AA7-6515-8905-7BBDE52A8B27}"/>
+              </a:ext>
+            </a:extLst>
+          </p:cNvPr>
+          <p:cNvCxnSpPr>
+            <a:cxnSpLocks/>
+            <a:stCxn id="4" idx="2"/>
+            <a:endCxn id="17" idx="0"/>
+          </p:cNvCxnSpPr>
+          <p:nvPr/>
+        </p:nvCxnSpPr>
+        <p:spPr>
+          <a:xfrm>
+            <a:off x="3820033" y="1414452"/>
+            <a:ext cx="0" cy="480775"/>
+          </a:xfrm>
+          <a:prstGeom prst="straightConnector1">
+            <a:avLst/>
+          </a:prstGeom>
+          <a:ln>
+            <a:prstDash val="sysDash"/>
+            <a:tailEnd type="triangle"/>
+          </a:ln>
+        </p:spPr>
+        <p:style>
+          <a:lnRef idx="2">
+            <a:schemeClr val="accent1"/>
+          </a:lnRef>
+          <a:fillRef idx="0">
+            <a:schemeClr val="accent1"/>
+          </a:fillRef>
+          <a:effectRef idx="1">
+            <a:schemeClr val="accent1"/>
+          </a:effectRef>
+          <a:fontRef idx="minor">
+            <a:schemeClr val="tx1"/>
+          </a:fontRef>
+        </p:style>
+      </p:cxnSp>
+      <p:pic>
+        <p:nvPicPr>
+          <p:cNvPr id="85" name="Image 84">
+            <a:extLst>
+              <a:ext uri="{FF2B5EF4-FFF2-40B4-BE49-F238E27FC236}">
+                <a16:creationId xmlns:a16="http://schemas.microsoft.com/office/drawing/2014/main" id="{635C279F-0DB5-2523-8D0E-67FE3BFDE712}"/>
+              </a:ext>
+            </a:extLst>
+          </p:cNvPr>
+          <p:cNvPicPr>
+            <a:picLocks noChangeAspect="1"/>
+          </p:cNvPicPr>
+          <p:nvPr/>
+        </p:nvPicPr>
+        <p:blipFill>
+          <a:blip r:embed="rId3">
+            <a:alphaModFix amt="50000"/>
+          </a:blip>
+          <a:stretch>
+            <a:fillRect/>
+          </a:stretch>
+        </p:blipFill>
+        <p:spPr>
+          <a:xfrm>
+            <a:off x="5330933" y="5082978"/>
+            <a:ext cx="3127369" cy="1635785"/>
+          </a:xfrm>
+          <a:prstGeom prst="rect">
+            <a:avLst/>
+          </a:prstGeom>
+        </p:spPr>
+      </p:pic>
+      <p:sp>
+        <p:nvSpPr>
+          <p:cNvPr id="86" name="ZoneTexte 85">
+            <a:extLst>
+              <a:ext uri="{FF2B5EF4-FFF2-40B4-BE49-F238E27FC236}">
+                <a16:creationId xmlns:a16="http://schemas.microsoft.com/office/drawing/2014/main" id="{7AF9B94D-EA9F-712B-5BD6-FEF4F3CAEB92}"/>
+              </a:ext>
+            </a:extLst>
+          </p:cNvPr>
+          <p:cNvSpPr txBox="1"/>
+          <p:nvPr/>
+        </p:nvSpPr>
+        <p:spPr>
+          <a:xfrm>
+            <a:off x="6191445" y="5185280"/>
+            <a:ext cx="564578" cy="369332"/>
+          </a:xfrm>
+          <a:prstGeom prst="rect">
+            <a:avLst/>
+          </a:prstGeom>
+          <a:noFill/>
+        </p:spPr>
+        <p:txBody>
+          <a:bodyPr wrap="none" rtlCol="0">
+            <a:spAutoFit/>
+          </a:bodyPr>
+          <a:lstStyle/>
+          <a:p>
+            <a:r>
+              <a:rPr lang="fr-FR" dirty="0"/>
+              <a:t>Im1</a:t>
+            </a:r>
+          </a:p>
+        </p:txBody>
+      </p:sp>
+      <p:sp>
+        <p:nvSpPr>
+          <p:cNvPr id="87" name="ZoneTexte 86">
+            <a:extLst>
+              <a:ext uri="{FF2B5EF4-FFF2-40B4-BE49-F238E27FC236}">
+                <a16:creationId xmlns:a16="http://schemas.microsoft.com/office/drawing/2014/main" id="{C108F6B6-E5EA-787F-F6F4-E43C78AD6CEA}"/>
+              </a:ext>
+            </a:extLst>
+          </p:cNvPr>
+          <p:cNvSpPr txBox="1"/>
+          <p:nvPr/>
+        </p:nvSpPr>
+        <p:spPr>
+          <a:xfrm>
+            <a:off x="7467859" y="5189121"/>
+            <a:ext cx="564578" cy="369332"/>
+          </a:xfrm>
+          <a:prstGeom prst="rect">
+            <a:avLst/>
+          </a:prstGeom>
+          <a:noFill/>
+        </p:spPr>
+        <p:txBody>
+          <a:bodyPr wrap="none" rtlCol="0">
+            <a:spAutoFit/>
+          </a:bodyPr>
+          <a:lstStyle/>
+          <a:p>
+            <a:r>
+              <a:rPr lang="fr-FR" dirty="0"/>
+              <a:t>Im2</a:t>
+            </a:r>
+          </a:p>
+        </p:txBody>
+      </p:sp>
+      <p:sp>
+        <p:nvSpPr>
+          <p:cNvPr id="88" name="ZoneTexte 87">
+            <a:extLst>
+              <a:ext uri="{FF2B5EF4-FFF2-40B4-BE49-F238E27FC236}">
+                <a16:creationId xmlns:a16="http://schemas.microsoft.com/office/drawing/2014/main" id="{F0F2CEDB-6EC9-37A0-5C9D-93F074839219}"/>
+              </a:ext>
+            </a:extLst>
+          </p:cNvPr>
+          <p:cNvSpPr txBox="1"/>
+          <p:nvPr/>
+        </p:nvSpPr>
+        <p:spPr>
+          <a:xfrm>
+            <a:off x="6809654" y="6077460"/>
+            <a:ext cx="619465" cy="369332"/>
+          </a:xfrm>
+          <a:prstGeom prst="rect">
+            <a:avLst/>
+          </a:prstGeom>
+          <a:noFill/>
+        </p:spPr>
+        <p:txBody>
+          <a:bodyPr wrap="none" rtlCol="0">
+            <a:spAutoFit/>
+          </a:bodyPr>
+          <a:lstStyle/>
+          <a:p>
+            <a:r>
+              <a:rPr lang="fr-FR" dirty="0"/>
+              <a:t>OCT</a:t>
+            </a:r>
+          </a:p>
+        </p:txBody>
+      </p:sp>
+      <p:sp>
+        <p:nvSpPr>
+          <p:cNvPr id="89" name="ZoneTexte 88">
+            <a:extLst>
+              <a:ext uri="{FF2B5EF4-FFF2-40B4-BE49-F238E27FC236}">
+                <a16:creationId xmlns:a16="http://schemas.microsoft.com/office/drawing/2014/main" id="{F650FD72-50D6-6918-16EF-8035EAD71CBE}"/>
+              </a:ext>
+            </a:extLst>
+          </p:cNvPr>
+          <p:cNvSpPr txBox="1"/>
+          <p:nvPr/>
+        </p:nvSpPr>
+        <p:spPr>
+          <a:xfrm>
+            <a:off x="5256246" y="5336132"/>
+            <a:ext cx="649537" cy="261610"/>
+          </a:xfrm>
+          <a:prstGeom prst="rect">
+            <a:avLst/>
+          </a:prstGeom>
+          <a:noFill/>
+        </p:spPr>
+        <p:txBody>
+          <a:bodyPr wrap="none" rtlCol="0">
+            <a:spAutoFit/>
+          </a:bodyPr>
+          <a:lstStyle/>
+          <a:p>
+            <a:r>
+              <a:rPr lang="fr-FR" sz="1100" dirty="0"/>
+              <a:t>camera</a:t>
+            </a:r>
+          </a:p>
+        </p:txBody>
+      </p:sp>
+      <p:sp>
+        <p:nvSpPr>
+          <p:cNvPr id="90" name="ZoneTexte 89">
+            <a:extLst>
+              <a:ext uri="{FF2B5EF4-FFF2-40B4-BE49-F238E27FC236}">
+                <a16:creationId xmlns:a16="http://schemas.microsoft.com/office/drawing/2014/main" id="{6FAE943A-F507-3038-608D-96420C330F33}"/>
+              </a:ext>
+            </a:extLst>
+          </p:cNvPr>
+          <p:cNvSpPr txBox="1"/>
+          <p:nvPr/>
+        </p:nvSpPr>
+        <p:spPr>
+          <a:xfrm>
+            <a:off x="5256246" y="5759689"/>
+            <a:ext cx="649537" cy="430887"/>
+          </a:xfrm>
+          <a:prstGeom prst="rect">
+            <a:avLst/>
+          </a:prstGeom>
+          <a:noFill/>
+        </p:spPr>
+        <p:txBody>
+          <a:bodyPr wrap="none" rtlCol="0">
+            <a:spAutoFit/>
+          </a:bodyPr>
+          <a:lstStyle/>
+          <a:p>
+            <a:pPr algn="ctr"/>
+            <a:r>
+              <a:rPr lang="fr-FR" sz="1100" dirty="0"/>
+              <a:t>stepper</a:t>
+            </a:r>
+          </a:p>
+          <a:p>
+            <a:pPr algn="ctr"/>
+            <a:r>
+              <a:rPr lang="fr-FR" sz="1100" dirty="0"/>
+              <a:t>piezo</a:t>
+            </a:r>
+          </a:p>
+        </p:txBody>
+      </p:sp>
+      <p:sp>
+        <p:nvSpPr>
+          <p:cNvPr id="91" name="ZoneTexte 90">
+            <a:extLst>
+              <a:ext uri="{FF2B5EF4-FFF2-40B4-BE49-F238E27FC236}">
+                <a16:creationId xmlns:a16="http://schemas.microsoft.com/office/drawing/2014/main" id="{653E427C-D5D3-08F6-B476-25D9334C9A7B}"/>
+              </a:ext>
+            </a:extLst>
+          </p:cNvPr>
+          <p:cNvSpPr txBox="1"/>
+          <p:nvPr/>
+        </p:nvSpPr>
+        <p:spPr>
+          <a:xfrm>
+            <a:off x="5147756" y="6247364"/>
+            <a:ext cx="862737" cy="261610"/>
+          </a:xfrm>
+          <a:prstGeom prst="rect">
+            <a:avLst/>
+          </a:prstGeom>
+          <a:noFill/>
+        </p:spPr>
+        <p:txBody>
+          <a:bodyPr wrap="none" rtlCol="0">
+            <a:spAutoFit/>
+          </a:bodyPr>
+          <a:lstStyle/>
+          <a:p>
+            <a:pPr algn="ctr"/>
+            <a:r>
+              <a:rPr lang="fr-FR" sz="1100" dirty="0"/>
+              <a:t>acquisition</a:t>
+            </a:r>
+          </a:p>
+        </p:txBody>
+      </p:sp>
+      <p:cxnSp>
+        <p:nvCxnSpPr>
+          <p:cNvPr id="92" name="Connecteur droit avec flèche 91">
+            <a:extLst>
+              <a:ext uri="{FF2B5EF4-FFF2-40B4-BE49-F238E27FC236}">
+                <a16:creationId xmlns:a16="http://schemas.microsoft.com/office/drawing/2014/main" id="{152B8947-C32D-71E2-180E-FB283ABAF81A}"/>
+              </a:ext>
+            </a:extLst>
+          </p:cNvPr>
+          <p:cNvCxnSpPr>
+            <a:cxnSpLocks/>
+            <a:endCxn id="19" idx="0"/>
+          </p:cNvCxnSpPr>
+          <p:nvPr/>
+        </p:nvCxnSpPr>
+        <p:spPr>
+          <a:xfrm>
+            <a:off x="3830560" y="5918008"/>
+            <a:ext cx="3360" cy="187299"/>
+          </a:xfrm>
+          <a:prstGeom prst="straightConnector1">
+            <a:avLst/>
+          </a:prstGeom>
+          <a:ln>
+            <a:prstDash val="sysDash"/>
+            <a:tailEnd type="triangle"/>
+          </a:ln>
+        </p:spPr>
+        <p:style>
+          <a:lnRef idx="2">
+            <a:schemeClr val="accent1"/>
+          </a:lnRef>
+          <a:fillRef idx="0">
+            <a:schemeClr val="accent1"/>
+          </a:fillRef>
+          <a:effectRef idx="1">
+            <a:schemeClr val="accent1"/>
+          </a:effectRef>
+          <a:fontRef idx="minor">
+            <a:schemeClr val="tx1"/>
+          </a:fontRef>
+        </p:style>
+      </p:cxnSp>
+      <p:cxnSp>
+        <p:nvCxnSpPr>
+          <p:cNvPr id="95" name="Connecteur droit avec flèche 94">
+            <a:extLst>
+              <a:ext uri="{FF2B5EF4-FFF2-40B4-BE49-F238E27FC236}">
+                <a16:creationId xmlns:a16="http://schemas.microsoft.com/office/drawing/2014/main" id="{2873B9CF-0B67-331F-4A1A-A2B470CC46B7}"/>
+              </a:ext>
+            </a:extLst>
+          </p:cNvPr>
+          <p:cNvCxnSpPr>
+            <a:cxnSpLocks/>
+          </p:cNvCxnSpPr>
+          <p:nvPr/>
+        </p:nvCxnSpPr>
+        <p:spPr>
+          <a:xfrm>
+            <a:off x="3817231" y="2462344"/>
+            <a:ext cx="13328" cy="88105"/>
+          </a:xfrm>
+          <a:prstGeom prst="straightConnector1">
+            <a:avLst/>
+          </a:prstGeom>
+          <a:ln>
+            <a:prstDash val="sysDash"/>
+            <a:headEnd type="none" w="med" len="med"/>
+            <a:tailEnd type="none" w="med" len="med"/>
+          </a:ln>
+        </p:spPr>
+        <p:style>
+          <a:lnRef idx="2">
+            <a:schemeClr val="accent1"/>
+          </a:lnRef>
+          <a:fillRef idx="0">
+            <a:schemeClr val="accent1"/>
+          </a:fillRef>
+          <a:effectRef idx="1">
+            <a:schemeClr val="accent1"/>
+          </a:effectRef>
+          <a:fontRef idx="minor">
+            <a:schemeClr val="tx1"/>
+          </a:fontRef>
+        </p:style>
+      </p:cxnSp>
+      <p:cxnSp>
+        <p:nvCxnSpPr>
+          <p:cNvPr id="114" name="Connecteur : en angle 113">
+            <a:extLst>
+              <a:ext uri="{FF2B5EF4-FFF2-40B4-BE49-F238E27FC236}">
+                <a16:creationId xmlns:a16="http://schemas.microsoft.com/office/drawing/2014/main" id="{A37FEDDF-B7EF-5B1C-9B8B-B250EEC4629E}"/>
+              </a:ext>
+            </a:extLst>
+          </p:cNvPr>
+          <p:cNvCxnSpPr>
+            <a:cxnSpLocks/>
+            <a:stCxn id="30" idx="2"/>
+          </p:cNvCxnSpPr>
+          <p:nvPr/>
+        </p:nvCxnSpPr>
+        <p:spPr>
+          <a:xfrm rot="5400000" flipH="1">
+            <a:off x="2756354" y="3238934"/>
+            <a:ext cx="1558715" cy="1509355"/>
+          </a:xfrm>
+          <a:prstGeom prst="bentConnector3">
+            <a:avLst>
+              <a:gd name="adj1" fmla="val -14666"/>
+            </a:avLst>
+          </a:prstGeom>
+          <a:ln>
+            <a:prstDash val="sysDash"/>
+            <a:tailEnd type="triangle"/>
+          </a:ln>
+        </p:spPr>
+        <p:style>
+          <a:lnRef idx="2">
+            <a:schemeClr val="accent1"/>
+          </a:lnRef>
+          <a:fillRef idx="0">
+            <a:schemeClr val="accent1"/>
+          </a:fillRef>
+          <a:effectRef idx="1">
+            <a:schemeClr val="accent1"/>
+          </a:effectRef>
+          <a:fontRef idx="minor">
+            <a:schemeClr val="tx1"/>
+          </a:fontRef>
+        </p:style>
+      </p:cxnSp>
+      <p:cxnSp>
+        <p:nvCxnSpPr>
+          <p:cNvPr id="118" name="Connecteur : en angle 117">
+            <a:extLst>
+              <a:ext uri="{FF2B5EF4-FFF2-40B4-BE49-F238E27FC236}">
+                <a16:creationId xmlns:a16="http://schemas.microsoft.com/office/drawing/2014/main" id="{6F06DF05-6105-A8FB-35B1-778FAB09E841}"/>
+              </a:ext>
+            </a:extLst>
+          </p:cNvPr>
+          <p:cNvCxnSpPr>
+            <a:cxnSpLocks/>
+            <a:endCxn id="20" idx="0"/>
+          </p:cNvCxnSpPr>
+          <p:nvPr/>
+        </p:nvCxnSpPr>
+        <p:spPr>
+          <a:xfrm>
+            <a:off x="3830559" y="2550449"/>
+            <a:ext cx="459840" cy="188117"/>
+          </a:xfrm>
+          <a:prstGeom prst="bentConnector2">
+            <a:avLst/>
+          </a:prstGeom>
+          <a:ln>
+            <a:prstDash val="sysDash"/>
+            <a:tailEnd type="triangle"/>
+          </a:ln>
+        </p:spPr>
+        <p:style>
+          <a:lnRef idx="2">
+            <a:schemeClr val="accent1"/>
+          </a:lnRef>
+          <a:fillRef idx="0">
+            <a:schemeClr val="accent1"/>
+          </a:fillRef>
+          <a:effectRef idx="1">
+            <a:schemeClr val="accent1"/>
+          </a:effectRef>
+          <a:fontRef idx="minor">
+            <a:schemeClr val="tx1"/>
+          </a:fontRef>
+        </p:style>
+      </p:cxnSp>
+      <p:cxnSp>
+        <p:nvCxnSpPr>
+          <p:cNvPr id="125" name="Connecteur : en angle 124">
+            <a:extLst>
+              <a:ext uri="{FF2B5EF4-FFF2-40B4-BE49-F238E27FC236}">
+                <a16:creationId xmlns:a16="http://schemas.microsoft.com/office/drawing/2014/main" id="{3B159F9F-37ED-E81F-1A15-9F51EA705F0D}"/>
+              </a:ext>
+            </a:extLst>
+          </p:cNvPr>
+          <p:cNvCxnSpPr>
+            <a:cxnSpLocks/>
+          </p:cNvCxnSpPr>
+          <p:nvPr/>
+        </p:nvCxnSpPr>
+        <p:spPr>
+          <a:xfrm flipV="1">
+            <a:off x="2781034" y="2550449"/>
+            <a:ext cx="1049525" cy="687380"/>
+          </a:xfrm>
+          <a:prstGeom prst="bentConnector3">
+            <a:avLst>
+              <a:gd name="adj1" fmla="val 476"/>
+            </a:avLst>
+          </a:prstGeom>
+          <a:ln>
+            <a:prstDash val="sysDash"/>
+            <a:tailEnd type="triangle"/>
+          </a:ln>
+        </p:spPr>
+        <p:style>
+          <a:lnRef idx="2">
+            <a:schemeClr val="accent1"/>
+          </a:lnRef>
+          <a:fillRef idx="0">
+            <a:schemeClr val="accent1"/>
+          </a:fillRef>
+          <a:effectRef idx="1">
+            <a:schemeClr val="accent1"/>
+          </a:effectRef>
+          <a:fontRef idx="minor">
+            <a:schemeClr val="tx1"/>
+          </a:fontRef>
+        </p:style>
+      </p:cxnSp>
+      <p:cxnSp>
+        <p:nvCxnSpPr>
+          <p:cNvPr id="133" name="Connecteur : en angle 132">
+            <a:extLst>
+              <a:ext uri="{FF2B5EF4-FFF2-40B4-BE49-F238E27FC236}">
+                <a16:creationId xmlns:a16="http://schemas.microsoft.com/office/drawing/2014/main" id="{685A9A4D-600C-24B8-3C46-C5400A046D50}"/>
+              </a:ext>
+            </a:extLst>
+          </p:cNvPr>
+          <p:cNvCxnSpPr>
+            <a:cxnSpLocks/>
+          </p:cNvCxnSpPr>
+          <p:nvPr/>
+        </p:nvCxnSpPr>
+        <p:spPr>
+          <a:xfrm rot="10800000" flipV="1">
+            <a:off x="4290390" y="4197718"/>
+            <a:ext cx="2990667" cy="804418"/>
+          </a:xfrm>
+          <a:prstGeom prst="bentConnector3">
+            <a:avLst>
+              <a:gd name="adj1" fmla="val 16528"/>
+            </a:avLst>
+          </a:prstGeom>
+          <a:ln>
+            <a:prstDash val="sysDash"/>
+            <a:tailEnd type="triangle"/>
+          </a:ln>
+        </p:spPr>
+        <p:style>
+          <a:lnRef idx="2">
+            <a:schemeClr val="accent1"/>
+          </a:lnRef>
+          <a:fillRef idx="0">
+            <a:schemeClr val="accent1"/>
+          </a:fillRef>
+          <a:effectRef idx="1">
+            <a:schemeClr val="accent1"/>
+          </a:effectRef>
+          <a:fontRef idx="minor">
+            <a:schemeClr val="tx1"/>
+          </a:fontRef>
+        </p:style>
+      </p:cxnSp>
+    </p:spTree>
+    <p:extLst>
+      <p:ext uri="{BB962C8B-B14F-4D97-AF65-F5344CB8AC3E}">
+        <p14:creationId xmlns:p14="http://schemas.microsoft.com/office/powerpoint/2010/main" val="1224447625"/>
       </p:ext>
     </p:extLst>
   </p:cSld>

</xml_diff>